<commit_message>
Added Marktumfeld , History, Entwicklung,Ziele
</commit_message>
<xml_diff>
--- a/PlanseeGroup.pptx
+++ b/PlanseeGroup.pptx
@@ -115,6 +115,11 @@
       </a:defRPr>
     </a:lvl9pPr>
   </p:defaultTextStyle>
+  <p:extLst>
+    <p:ext uri="{EFAFB233-063F-42B5-8137-9DF3F51BA10A}">
+      <p15:sldGuideLst xmlns:p15="http://schemas.microsoft.com/office/powerpoint/2012/main"/>
+    </p:ext>
+  </p:extLst>
 </p:presentation>
 </file>
 
@@ -359,7 +364,7 @@
           <a:p>
             <a:fld id="{48EDD995-683E-4D85-9C42-851AB99740B3}" type="slidenum">
               <a:rPr lang="de-AT" smtClean="0"/>
-              <a:t>‹#›</a:t>
+              <a:t>‹Nr.›</a:t>
             </a:fld>
             <a:endParaRPr lang="de-AT"/>
           </a:p>
@@ -868,7 +873,7 @@
           <a:p>
             <a:fld id="{7E4B9D8A-30A2-4509-8A2B-BAB999C5542B}" type="slidenum">
               <a:rPr lang="de-AT" smtClean="0"/>
-              <a:t>‹#›</a:t>
+              <a:t>‹Nr.›</a:t>
             </a:fld>
             <a:endParaRPr lang="de-AT"/>
           </a:p>
@@ -1147,7 +1152,7 @@
           <a:p>
             <a:fld id="{7E4B9D8A-30A2-4509-8A2B-BAB999C5542B}" type="slidenum">
               <a:rPr lang="de-AT" smtClean="0"/>
-              <a:t>‹#›</a:t>
+              <a:t>‹Nr.›</a:t>
             </a:fld>
             <a:endParaRPr lang="de-AT"/>
           </a:p>
@@ -1345,7 +1350,7 @@
           <a:p>
             <a:fld id="{7E4B9D8A-30A2-4509-8A2B-BAB999C5542B}" type="slidenum">
               <a:rPr lang="de-AT" smtClean="0"/>
-              <a:t>‹#›</a:t>
+              <a:t>‹Nr.›</a:t>
             </a:fld>
             <a:endParaRPr lang="de-AT"/>
           </a:p>
@@ -1622,7 +1627,7 @@
           <a:p>
             <a:fld id="{7E4B9D8A-30A2-4509-8A2B-BAB999C5542B}" type="slidenum">
               <a:rPr lang="de-AT" smtClean="0"/>
-              <a:t>‹#›</a:t>
+              <a:t>‹Nr.›</a:t>
             </a:fld>
             <a:endParaRPr lang="de-AT"/>
           </a:p>
@@ -1967,7 +1972,7 @@
           <a:p>
             <a:fld id="{7E4B9D8A-30A2-4509-8A2B-BAB999C5542B}" type="slidenum">
               <a:rPr lang="de-AT" smtClean="0"/>
-              <a:t>‹#›</a:t>
+              <a:t>‹Nr.›</a:t>
             </a:fld>
             <a:endParaRPr lang="de-AT"/>
           </a:p>
@@ -2594,7 +2599,7 @@
           <a:p>
             <a:fld id="{7E4B9D8A-30A2-4509-8A2B-BAB999C5542B}" type="slidenum">
               <a:rPr lang="de-AT" smtClean="0"/>
-              <a:t>‹#›</a:t>
+              <a:t>‹Nr.›</a:t>
             </a:fld>
             <a:endParaRPr lang="de-AT"/>
           </a:p>
@@ -3458,7 +3463,7 @@
           <a:p>
             <a:fld id="{7E4B9D8A-30A2-4509-8A2B-BAB999C5542B}" type="slidenum">
               <a:rPr lang="de-AT" smtClean="0"/>
-              <a:t>‹#›</a:t>
+              <a:t>‹Nr.›</a:t>
             </a:fld>
             <a:endParaRPr lang="de-AT"/>
           </a:p>
@@ -3632,7 +3637,7 @@
           <a:p>
             <a:fld id="{7E4B9D8A-30A2-4509-8A2B-BAB999C5542B}" type="slidenum">
               <a:rPr lang="de-AT" smtClean="0"/>
-              <a:t>‹#›</a:t>
+              <a:t>‹Nr.›</a:t>
             </a:fld>
             <a:endParaRPr lang="de-AT"/>
           </a:p>
@@ -3816,7 +3821,7 @@
           <a:p>
             <a:fld id="{7E4B9D8A-30A2-4509-8A2B-BAB999C5542B}" type="slidenum">
               <a:rPr lang="de-AT" smtClean="0"/>
-              <a:t>‹#›</a:t>
+              <a:t>‹Nr.›</a:t>
             </a:fld>
             <a:endParaRPr lang="de-AT"/>
           </a:p>
@@ -3990,7 +3995,7 @@
           <a:p>
             <a:fld id="{7E4B9D8A-30A2-4509-8A2B-BAB999C5542B}" type="slidenum">
               <a:rPr lang="de-AT" smtClean="0"/>
-              <a:t>‹#›</a:t>
+              <a:t>‹Nr.›</a:t>
             </a:fld>
             <a:endParaRPr lang="de-AT"/>
           </a:p>
@@ -4241,7 +4246,7 @@
           <a:p>
             <a:fld id="{7E4B9D8A-30A2-4509-8A2B-BAB999C5542B}" type="slidenum">
               <a:rPr lang="de-AT" smtClean="0"/>
-              <a:t>‹#›</a:t>
+              <a:t>‹Nr.›</a:t>
             </a:fld>
             <a:endParaRPr lang="de-AT"/>
           </a:p>
@@ -4537,7 +4542,7 @@
           <a:p>
             <a:fld id="{7E4B9D8A-30A2-4509-8A2B-BAB999C5542B}" type="slidenum">
               <a:rPr lang="de-AT" smtClean="0"/>
-              <a:t>‹#›</a:t>
+              <a:t>‹Nr.›</a:t>
             </a:fld>
             <a:endParaRPr lang="de-AT"/>
           </a:p>
@@ -4985,7 +4990,7 @@
           <a:p>
             <a:fld id="{7E4B9D8A-30A2-4509-8A2B-BAB999C5542B}" type="slidenum">
               <a:rPr lang="de-AT" smtClean="0"/>
-              <a:t>‹#›</a:t>
+              <a:t>‹Nr.›</a:t>
             </a:fld>
             <a:endParaRPr lang="de-AT"/>
           </a:p>
@@ -5107,7 +5112,7 @@
           <a:p>
             <a:fld id="{7E4B9D8A-30A2-4509-8A2B-BAB999C5542B}" type="slidenum">
               <a:rPr lang="de-AT" smtClean="0"/>
-              <a:t>‹#›</a:t>
+              <a:t>‹Nr.›</a:t>
             </a:fld>
             <a:endParaRPr lang="de-AT"/>
           </a:p>
@@ -5206,7 +5211,7 @@
           <a:p>
             <a:fld id="{7E4B9D8A-30A2-4509-8A2B-BAB999C5542B}" type="slidenum">
               <a:rPr lang="de-AT" smtClean="0"/>
-              <a:t>‹#›</a:t>
+              <a:t>‹Nr.›</a:t>
             </a:fld>
             <a:endParaRPr lang="de-AT"/>
           </a:p>
@@ -5489,7 +5494,7 @@
           <a:p>
             <a:fld id="{7E4B9D8A-30A2-4509-8A2B-BAB999C5542B}" type="slidenum">
               <a:rPr lang="de-AT" smtClean="0"/>
-              <a:t>‹#›</a:t>
+              <a:t>‹Nr.›</a:t>
             </a:fld>
             <a:endParaRPr lang="de-AT"/>
           </a:p>
@@ -5768,7 +5773,7 @@
           <a:p>
             <a:fld id="{7E4B9D8A-30A2-4509-8A2B-BAB999C5542B}" type="slidenum">
               <a:rPr lang="de-AT" smtClean="0"/>
-              <a:t>‹#›</a:t>
+              <a:t>‹Nr.›</a:t>
             </a:fld>
             <a:endParaRPr lang="de-AT"/>
           </a:p>
@@ -6238,7 +6243,7 @@
           <a:p>
             <a:fld id="{7E4B9D8A-30A2-4509-8A2B-BAB999C5542B}" type="slidenum">
               <a:rPr lang="de-AT" smtClean="0"/>
-              <a:t>‹#›</a:t>
+              <a:t>‹Nr.›</a:t>
             </a:fld>
             <a:endParaRPr lang="de-AT"/>
           </a:p>
@@ -6732,18 +6737,30 @@
           <a:p>
             <a:r>
               <a:rPr lang="de-AT" dirty="0" smtClean="0"/>
-              <a:t>Referat von </a:t>
-            </a:r>
-            <a:r>
-              <a:rPr lang="de-AT" dirty="0" err="1" smtClean="0"/>
+              <a:t>Referat </a:t>
+            </a:r>
+            <a:r>
+              <a:rPr lang="de-AT" dirty="0" smtClean="0"/>
+              <a:t>von </a:t>
+            </a:r>
+            <a:r>
+              <a:rPr lang="de-AT" dirty="0" smtClean="0"/>
               <a:t>Klepp</a:t>
             </a:r>
             <a:r>
+              <a:rPr lang="de-AT" dirty="0"/>
+              <a:t>, </a:t>
+            </a:r>
+            <a:r>
               <a:rPr lang="de-AT" dirty="0" smtClean="0"/>
-              <a:t>, Vogt, Mair, </a:t>
-            </a:r>
-            <a:r>
-              <a:rPr lang="de-AT" dirty="0" err="1" smtClean="0"/>
+              <a:t>Mair, </a:t>
+            </a:r>
+            <a:r>
+              <a:rPr lang="de-AT" dirty="0" smtClean="0"/>
+              <a:t>Vogt, </a:t>
+            </a:r>
+            <a:r>
+              <a:rPr lang="de-AT" dirty="0" smtClean="0"/>
               <a:t>Willinger</a:t>
             </a:r>
             <a:endParaRPr lang="de-AT" dirty="0"/>
@@ -7004,7 +7021,97 @@
           <a:bodyPr/>
           <a:lstStyle/>
           <a:p>
-            <a:endParaRPr lang="de-AT"/>
+            <a:r>
+              <a:rPr lang="de-AT" dirty="0" smtClean="0"/>
+              <a:t>1921 gegründet ,</a:t>
+            </a:r>
+            <a:r>
+              <a:rPr lang="de-AT" dirty="0" smtClean="0"/>
+              <a:t>Gründer Paul Schwarzkopf</a:t>
+            </a:r>
+          </a:p>
+          <a:p>
+            <a:endParaRPr lang="de-AT" dirty="0" smtClean="0"/>
+          </a:p>
+          <a:p>
+            <a:r>
+              <a:rPr lang="de-AT" dirty="0" smtClean="0"/>
+              <a:t>Standort </a:t>
+            </a:r>
+            <a:r>
+              <a:rPr lang="de-AT" dirty="0" err="1" smtClean="0"/>
+              <a:t>Breitenwang</a:t>
+            </a:r>
+            <a:r>
+              <a:rPr lang="de-AT" dirty="0" smtClean="0"/>
+              <a:t> </a:t>
+            </a:r>
+            <a:r>
+              <a:rPr lang="de-AT" dirty="0" smtClean="0">
+                <a:sym typeface="Wingdings" panose="05000000000000000000" pitchFamily="2" charset="2"/>
+              </a:rPr>
+              <a:t></a:t>
+            </a:r>
+          </a:p>
+          <a:p>
+            <a:r>
+              <a:rPr lang="de-AT" dirty="0" err="1" smtClean="0">
+                <a:sym typeface="Wingdings" panose="05000000000000000000" pitchFamily="2" charset="2"/>
+              </a:rPr>
+              <a:t>Plansee</a:t>
+            </a:r>
+            <a:r>
+              <a:rPr lang="de-AT" dirty="0" smtClean="0">
+                <a:sym typeface="Wingdings" panose="05000000000000000000" pitchFamily="2" charset="2"/>
+              </a:rPr>
+              <a:t> Wasserkraft, Platz zum Ausbau</a:t>
+            </a:r>
+          </a:p>
+          <a:p>
+            <a:pPr marL="0" indent="0">
+              <a:buNone/>
+            </a:pPr>
+            <a:endParaRPr lang="de-AT" dirty="0"/>
+          </a:p>
+          <a:p>
+            <a:r>
+              <a:rPr lang="de-AT" dirty="0" smtClean="0"/>
+              <a:t>Flucht USA wegen Nationalismus</a:t>
+            </a:r>
+            <a:r>
+              <a:rPr lang="de-AT" dirty="0" smtClean="0">
+                <a:sym typeface="Wingdings" panose="05000000000000000000" pitchFamily="2" charset="2"/>
+              </a:rPr>
+              <a:t> </a:t>
+            </a:r>
+          </a:p>
+          <a:p>
+            <a:r>
+              <a:rPr lang="de-AT" dirty="0" smtClean="0">
+                <a:sym typeface="Wingdings" panose="05000000000000000000" pitchFamily="2" charset="2"/>
+              </a:rPr>
+              <a:t>Deutsche Edelstahlwerk AG</a:t>
+            </a:r>
+          </a:p>
+          <a:p>
+            <a:endParaRPr lang="de-AT" dirty="0">
+              <a:sym typeface="Wingdings" panose="05000000000000000000" pitchFamily="2" charset="2"/>
+            </a:endParaRPr>
+          </a:p>
+          <a:p>
+            <a:r>
+              <a:rPr lang="de-AT" dirty="0" smtClean="0">
+                <a:sym typeface="Wingdings" panose="05000000000000000000" pitchFamily="2" charset="2"/>
+              </a:rPr>
+              <a:t>Wieder Eigentümer nach Kriegsende</a:t>
+            </a:r>
+            <a:endParaRPr lang="de-AT" dirty="0" smtClean="0"/>
+          </a:p>
+          <a:p>
+            <a:endParaRPr lang="de-AT" dirty="0"/>
+          </a:p>
+          <a:p>
+            <a:endParaRPr lang="de-AT" dirty="0"/>
           </a:p>
         </p:txBody>
       </p:sp>
@@ -7145,10 +7252,79 @@
         </p:nvSpPr>
         <p:spPr/>
         <p:txBody>
-          <a:bodyPr/>
-          <a:lstStyle/>
-          <a:p>
-            <a:endParaRPr lang="de-AT"/>
+          <a:bodyPr>
+            <a:normAutofit fontScale="92500" lnSpcReduction="10000"/>
+          </a:bodyPr>
+          <a:lstStyle/>
+          <a:p>
+            <a:r>
+              <a:rPr lang="de-AT" dirty="0" smtClean="0"/>
+              <a:t>Führender Anbieter weltweit</a:t>
+            </a:r>
+          </a:p>
+          <a:p>
+            <a:pPr marL="0" indent="0">
+              <a:buNone/>
+            </a:pPr>
+            <a:r>
+              <a:rPr lang="de-AT" dirty="0"/>
+              <a:t>	Hochtechnologie-Werkstoffe Molybdän und </a:t>
+            </a:r>
+            <a:r>
+              <a:rPr lang="de-AT" dirty="0" smtClean="0"/>
+              <a:t>Wolfram</a:t>
+            </a:r>
+          </a:p>
+          <a:p>
+            <a:pPr marL="0" indent="0">
+              <a:buNone/>
+            </a:pPr>
+            <a:endParaRPr lang="de-AT" dirty="0" smtClean="0"/>
+          </a:p>
+          <a:p>
+            <a:r>
+              <a:rPr lang="de-AT" dirty="0" smtClean="0"/>
+              <a:t>Geschäftsaktivität führende Markposition</a:t>
+            </a:r>
+          </a:p>
+          <a:p>
+            <a:endParaRPr lang="de-AT" dirty="0"/>
+          </a:p>
+          <a:p>
+            <a:r>
+              <a:rPr lang="de-AT" dirty="0" err="1" smtClean="0"/>
+              <a:t>Plansee</a:t>
+            </a:r>
+            <a:r>
+              <a:rPr lang="de-AT" dirty="0" smtClean="0"/>
+              <a:t> entwickelt sich besser als Markt</a:t>
+            </a:r>
+          </a:p>
+          <a:p>
+            <a:endParaRPr lang="de-AT" dirty="0"/>
+          </a:p>
+          <a:p>
+            <a:r>
+              <a:rPr lang="de-AT" dirty="0" smtClean="0"/>
+              <a:t>Klar positioniert, nachhaltig profitabel und erreichen ambitionierte Finanzziele</a:t>
+            </a:r>
+          </a:p>
+          <a:p>
+            <a:pPr marL="0" indent="0">
+              <a:buNone/>
+            </a:pPr>
+            <a:endParaRPr lang="de-AT" dirty="0" smtClean="0"/>
+          </a:p>
+          <a:p>
+            <a:r>
+              <a:rPr lang="de-AT" dirty="0" err="1" smtClean="0"/>
+              <a:t>Weiltweit</a:t>
+            </a:r>
+            <a:r>
+              <a:rPr lang="de-AT" dirty="0" smtClean="0"/>
+              <a:t> attraktiver Arbeitgeber</a:t>
+            </a:r>
+            <a:endParaRPr lang="de-AT" dirty="0"/>
           </a:p>
         </p:txBody>
       </p:sp>
@@ -7292,7 +7468,99 @@
           <a:bodyPr/>
           <a:lstStyle/>
           <a:p>
-            <a:endParaRPr lang="de-AT"/>
+            <a:r>
+              <a:rPr lang="de-AT" dirty="0" smtClean="0"/>
+              <a:t>Standorte Weltweit</a:t>
+            </a:r>
+          </a:p>
+          <a:p>
+            <a:pPr marL="0" indent="0">
+              <a:buNone/>
+            </a:pPr>
+            <a:endParaRPr lang="de-AT" dirty="0" smtClean="0"/>
+          </a:p>
+          <a:p>
+            <a:r>
+              <a:rPr lang="de-AT" dirty="0" smtClean="0"/>
+              <a:t>Besitzt Produktlinienstruktur</a:t>
+            </a:r>
+          </a:p>
+          <a:p>
+            <a:r>
+              <a:rPr lang="de-AT" dirty="0" smtClean="0"/>
+              <a:t>An der Börse notiert </a:t>
+            </a:r>
+          </a:p>
+          <a:p>
+            <a:pPr marL="0" indent="0">
+              <a:buNone/>
+            </a:pPr>
+            <a:endParaRPr lang="de-AT" dirty="0"/>
+          </a:p>
+          <a:p>
+            <a:r>
+              <a:rPr lang="de-AT" dirty="0"/>
+              <a:t>D</a:t>
+            </a:r>
+            <a:r>
+              <a:rPr lang="de-AT" dirty="0" smtClean="0"/>
+              <a:t>rei Hauptbereiche :</a:t>
+            </a:r>
+            <a:endParaRPr lang="de-AT" dirty="0"/>
+          </a:p>
+          <a:p>
+            <a:pPr marL="0" indent="0">
+              <a:buNone/>
+            </a:pPr>
+            <a:r>
+              <a:rPr lang="de-AT" dirty="0"/>
+              <a:t>	</a:t>
+            </a:r>
+            <a:r>
+              <a:rPr lang="de-AT" dirty="0" smtClean="0"/>
+              <a:t>PLANSEE Hochleistungswerkstoffe</a:t>
+            </a:r>
+          </a:p>
+          <a:p>
+            <a:pPr marL="0" indent="0">
+              <a:buNone/>
+            </a:pPr>
+            <a:r>
+              <a:rPr lang="de-AT" dirty="0"/>
+              <a:t>	</a:t>
+            </a:r>
+            <a:r>
+              <a:rPr lang="de-AT" dirty="0"/>
+              <a:t>CERATIZIT Hartstoffe &amp; </a:t>
+            </a:r>
+            <a:r>
+              <a:rPr lang="de-AT" dirty="0" smtClean="0"/>
+              <a:t>Werkzeuge</a:t>
+            </a:r>
+          </a:p>
+          <a:p>
+            <a:pPr marL="0" indent="0">
+              <a:buNone/>
+            </a:pPr>
+            <a:r>
+              <a:rPr lang="de-AT" dirty="0"/>
+              <a:t>	</a:t>
+            </a:r>
+            <a:r>
+              <a:rPr lang="de-AT" dirty="0"/>
+              <a:t>Global Tungsten &amp; </a:t>
+            </a:r>
+            <a:r>
+              <a:rPr lang="de-AT" dirty="0" err="1"/>
+              <a:t>Powders</a:t>
+            </a:r>
+            <a:endParaRPr lang="de-AT" dirty="0"/>
+          </a:p>
+          <a:p>
+            <a:pPr marL="0" indent="0">
+              <a:buNone/>
+            </a:pPr>
+            <a:endParaRPr lang="de-AT" dirty="0" smtClean="0"/>
           </a:p>
         </p:txBody>
       </p:sp>
@@ -7722,7 +7990,50 @@
           <a:bodyPr/>
           <a:lstStyle/>
           <a:p>
-            <a:endParaRPr lang="de-AT"/>
+            <a:r>
+              <a:rPr lang="de-AT" dirty="0" smtClean="0"/>
+              <a:t>Betriebsgeheimnisse an Konkurrenz weitergeleitet</a:t>
+            </a:r>
+          </a:p>
+          <a:p>
+            <a:endParaRPr lang="de-AT" dirty="0"/>
+          </a:p>
+          <a:p>
+            <a:r>
+              <a:rPr lang="de-AT" dirty="0" smtClean="0"/>
+              <a:t>Immer mehr Konkurrenz auf China</a:t>
+            </a:r>
+          </a:p>
+          <a:p>
+            <a:endParaRPr lang="de-AT" dirty="0"/>
+          </a:p>
+          <a:p>
+            <a:r>
+              <a:rPr lang="de-AT" dirty="0" smtClean="0"/>
+              <a:t>GTAT</a:t>
+            </a:r>
+            <a:r>
+              <a:rPr lang="de-AT" dirty="0"/>
+              <a:t> </a:t>
+            </a:r>
+            <a:r>
+              <a:rPr lang="de-AT" dirty="0" smtClean="0"/>
+              <a:t>Pleite </a:t>
+            </a:r>
+            <a:r>
+              <a:rPr lang="de-AT" dirty="0" smtClean="0"/>
+              <a:t>kostet 80 Arbeitsplätze </a:t>
+            </a:r>
+          </a:p>
+          <a:p>
+            <a:endParaRPr lang="de-AT" dirty="0"/>
+          </a:p>
+          <a:p>
+            <a:r>
+              <a:rPr lang="de-AT" dirty="0" smtClean="0"/>
+              <a:t>Zeitkonten für Mitarbeiter eingeführt</a:t>
+            </a:r>
+            <a:endParaRPr lang="de-AT" dirty="0"/>
           </a:p>
         </p:txBody>
       </p:sp>

</xml_diff>